<commit_message>
adding a file whic was previously being tracked in .gitignore
</commit_message>
<xml_diff>
--- a/New Microsoft PowerPoint Presentation.pptx
+++ b/New Microsoft PowerPoint Presentation.pptx
@@ -243,7 +243,7 @@
           <a:p>
             <a:fld id="{692224ED-DFA0-4E6E-BD19-DA5ACEE7B7A0}" type="datetimeFigureOut">
               <a:rPr lang="en-IN" smtClean="0"/>
-              <a:t>27-07-2021</a:t>
+              <a:t>28-07-2021</a:t>
             </a:fld>
             <a:endParaRPr lang="en-IN"/>
           </a:p>
@@ -413,7 +413,7 @@
           <a:p>
             <a:fld id="{692224ED-DFA0-4E6E-BD19-DA5ACEE7B7A0}" type="datetimeFigureOut">
               <a:rPr lang="en-IN" smtClean="0"/>
-              <a:t>27-07-2021</a:t>
+              <a:t>28-07-2021</a:t>
             </a:fld>
             <a:endParaRPr lang="en-IN"/>
           </a:p>
@@ -593,7 +593,7 @@
           <a:p>
             <a:fld id="{692224ED-DFA0-4E6E-BD19-DA5ACEE7B7A0}" type="datetimeFigureOut">
               <a:rPr lang="en-IN" smtClean="0"/>
-              <a:t>27-07-2021</a:t>
+              <a:t>28-07-2021</a:t>
             </a:fld>
             <a:endParaRPr lang="en-IN"/>
           </a:p>
@@ -763,7 +763,7 @@
           <a:p>
             <a:fld id="{692224ED-DFA0-4E6E-BD19-DA5ACEE7B7A0}" type="datetimeFigureOut">
               <a:rPr lang="en-IN" smtClean="0"/>
-              <a:t>27-07-2021</a:t>
+              <a:t>28-07-2021</a:t>
             </a:fld>
             <a:endParaRPr lang="en-IN"/>
           </a:p>
@@ -1009,7 +1009,7 @@
           <a:p>
             <a:fld id="{692224ED-DFA0-4E6E-BD19-DA5ACEE7B7A0}" type="datetimeFigureOut">
               <a:rPr lang="en-IN" smtClean="0"/>
-              <a:t>27-07-2021</a:t>
+              <a:t>28-07-2021</a:t>
             </a:fld>
             <a:endParaRPr lang="en-IN"/>
           </a:p>
@@ -1241,7 +1241,7 @@
           <a:p>
             <a:fld id="{692224ED-DFA0-4E6E-BD19-DA5ACEE7B7A0}" type="datetimeFigureOut">
               <a:rPr lang="en-IN" smtClean="0"/>
-              <a:t>27-07-2021</a:t>
+              <a:t>28-07-2021</a:t>
             </a:fld>
             <a:endParaRPr lang="en-IN"/>
           </a:p>
@@ -1608,7 +1608,7 @@
           <a:p>
             <a:fld id="{692224ED-DFA0-4E6E-BD19-DA5ACEE7B7A0}" type="datetimeFigureOut">
               <a:rPr lang="en-IN" smtClean="0"/>
-              <a:t>27-07-2021</a:t>
+              <a:t>28-07-2021</a:t>
             </a:fld>
             <a:endParaRPr lang="en-IN"/>
           </a:p>
@@ -1726,7 +1726,7 @@
           <a:p>
             <a:fld id="{692224ED-DFA0-4E6E-BD19-DA5ACEE7B7A0}" type="datetimeFigureOut">
               <a:rPr lang="en-IN" smtClean="0"/>
-              <a:t>27-07-2021</a:t>
+              <a:t>28-07-2021</a:t>
             </a:fld>
             <a:endParaRPr lang="en-IN"/>
           </a:p>
@@ -1821,7 +1821,7 @@
           <a:p>
             <a:fld id="{692224ED-DFA0-4E6E-BD19-DA5ACEE7B7A0}" type="datetimeFigureOut">
               <a:rPr lang="en-IN" smtClean="0"/>
-              <a:t>27-07-2021</a:t>
+              <a:t>28-07-2021</a:t>
             </a:fld>
             <a:endParaRPr lang="en-IN"/>
           </a:p>
@@ -2098,7 +2098,7 @@
           <a:p>
             <a:fld id="{692224ED-DFA0-4E6E-BD19-DA5ACEE7B7A0}" type="datetimeFigureOut">
               <a:rPr lang="en-IN" smtClean="0"/>
-              <a:t>27-07-2021</a:t>
+              <a:t>28-07-2021</a:t>
             </a:fld>
             <a:endParaRPr lang="en-IN"/>
           </a:p>
@@ -2351,7 +2351,7 @@
           <a:p>
             <a:fld id="{692224ED-DFA0-4E6E-BD19-DA5ACEE7B7A0}" type="datetimeFigureOut">
               <a:rPr lang="en-IN" smtClean="0"/>
-              <a:t>27-07-2021</a:t>
+              <a:t>28-07-2021</a:t>
             </a:fld>
             <a:endParaRPr lang="en-IN"/>
           </a:p>
@@ -2564,7 +2564,7 @@
           <a:p>
             <a:fld id="{692224ED-DFA0-4E6E-BD19-DA5ACEE7B7A0}" type="datetimeFigureOut">
               <a:rPr lang="en-IN" smtClean="0"/>
-              <a:t>27-07-2021</a:t>
+              <a:t>28-07-2021</a:t>
             </a:fld>
             <a:endParaRPr lang="en-IN"/>
           </a:p>
@@ -2990,11 +2990,7 @@
             </a:r>
             <a:r>
               <a:rPr lang="en-IN" smtClean="0"/>
-              <a:t>git </a:t>
-            </a:r>
-            <a:r>
-              <a:rPr lang="en-IN" smtClean="0"/>
-              <a:t>Tutorial</a:t>
+              <a:t>git Tutorial</a:t>
             </a:r>
             <a:br>
               <a:rPr lang="en-IN" smtClean="0"/>
@@ -3018,6 +3014,10 @@
           <a:bodyPr/>
           <a:lstStyle/>
           <a:p>
+            <a:r>
+              <a:rPr lang="en-IN" smtClean="0"/>
+              <a:t>Thankyou</a:t>
+            </a:r>
             <a:endParaRPr lang="en-IN"/>
           </a:p>
         </p:txBody>

</xml_diff>